<commit_message>
added Week 2 homework
</commit_message>
<xml_diff>
--- a/Week 2 -- mixed-effects/Lab 2/Lab 2 -- Mixed-effects models.pptx
+++ b/Week 2 -- mixed-effects/Lab 2/Lab 2 -- Mixed-effects models.pptx
@@ -5,7 +5,7 @@
     <p:sldMasterId id="2147483672" r:id="rId1"/>
   </p:sldMasterIdLst>
   <p:notesMasterIdLst>
-    <p:notesMasterId r:id="rId16"/>
+    <p:notesMasterId r:id="rId19"/>
   </p:notesMasterIdLst>
   <p:sldIdLst>
     <p:sldId id="266" r:id="rId2"/>
@@ -22,6 +22,9 @@
     <p:sldId id="275" r:id="rId13"/>
     <p:sldId id="272" r:id="rId14"/>
     <p:sldId id="279" r:id="rId15"/>
+    <p:sldId id="281" r:id="rId16"/>
+    <p:sldId id="282" r:id="rId17"/>
+    <p:sldId id="280" r:id="rId18"/>
   </p:sldIdLst>
   <p:sldSz cx="9144000" cy="6858000" type="screen4x3"/>
   <p:notesSz cx="6858000" cy="9144000"/>
@@ -3556,7 +3559,6 @@
               <a:rPr lang="en-US" dirty="0"/>
               <a:t>Mixed-effects models</a:t>
             </a:r>
-            <a:endParaRPr lang="en-US" dirty="0"/>
           </a:p>
         </p:txBody>
       </p:sp>
@@ -3650,7 +3652,6 @@
               <a:rPr lang="en-US" dirty="0"/>
               <a:t>Mixed-effects models</a:t>
             </a:r>
-            <a:endParaRPr lang="en-US" dirty="0"/>
           </a:p>
         </p:txBody>
       </p:sp>
@@ -4705,7 +4706,6 @@
               <a:rPr lang="en-US" dirty="0"/>
               <a:t>Mixed-effects models</a:t>
             </a:r>
-            <a:endParaRPr lang="en-US" dirty="0"/>
           </a:p>
         </p:txBody>
       </p:sp>
@@ -4795,7 +4795,6 @@
               <a:rPr lang="en-US" dirty="0"/>
               <a:t>Mixed-effects models</a:t>
             </a:r>
-            <a:endParaRPr lang="en-US" dirty="0"/>
           </a:p>
         </p:txBody>
       </p:sp>
@@ -4930,8 +4929,8 @@
           </a:p>
         </p:txBody>
       </p:sp>
-      <mc:AlternateContent xmlns:mc="http://schemas.openxmlformats.org/markup-compatibility/2006">
-        <mc:Choice xmlns:a14="http://schemas.microsoft.com/office/drawing/2010/main" Requires="a14">
+      <mc:AlternateContent xmlns:mc="http://schemas.openxmlformats.org/markup-compatibility/2006" xmlns:a14="http://schemas.microsoft.com/office/drawing/2010/main">
+        <mc:Choice Requires="a14">
           <p:sp>
             <p:nvSpPr>
               <p:cNvPr id="3" name="Content Placeholder 2"/>
@@ -5654,7 +5653,7 @@
             </p:txBody>
           </p:sp>
         </mc:Choice>
-        <mc:Fallback>
+        <mc:Fallback xmlns="">
           <p:sp>
             <p:nvSpPr>
               <p:cNvPr id="3" name="Content Placeholder 2"/>
@@ -5692,6 +5691,1047 @@
     <p:extLst>
       <p:ext uri="{BB962C8B-B14F-4D97-AF65-F5344CB8AC3E}">
         <p14:creationId xmlns:p14="http://schemas.microsoft.com/office/powerpoint/2010/main" val="3264197117"/>
+      </p:ext>
+    </p:extLst>
+  </p:cSld>
+  <p:clrMapOvr>
+    <a:masterClrMapping/>
+  </p:clrMapOvr>
+</p:sld>
+</file>
+
+<file path=ppt/slides/slide15.xml><?xml version="1.0" encoding="utf-8"?>
+<p:sld xmlns:a="http://schemas.openxmlformats.org/drawingml/2006/main" xmlns:r="http://schemas.openxmlformats.org/officeDocument/2006/relationships" xmlns:p="http://schemas.openxmlformats.org/presentationml/2006/main">
+  <p:cSld>
+    <p:spTree>
+      <p:nvGrpSpPr>
+        <p:cNvPr id="1" name=""/>
+        <p:cNvGrpSpPr/>
+        <p:nvPr/>
+      </p:nvGrpSpPr>
+      <p:grpSpPr>
+        <a:xfrm>
+          <a:off x="0" y="0"/>
+          <a:ext cx="0" cy="0"/>
+          <a:chOff x="0" y="0"/>
+          <a:chExt cx="0" cy="0"/>
+        </a:xfrm>
+      </p:grpSpPr>
+      <p:sp>
+        <p:nvSpPr>
+          <p:cNvPr id="2" name="Title 1"/>
+          <p:cNvSpPr>
+            <a:spLocks noGrp="1"/>
+          </p:cNvSpPr>
+          <p:nvPr>
+            <p:ph type="title"/>
+          </p:nvPr>
+        </p:nvSpPr>
+        <p:spPr/>
+        <p:txBody>
+          <a:bodyPr/>
+          <a:lstStyle/>
+          <a:p>
+            <a:endParaRPr lang="en-GB"/>
+          </a:p>
+        </p:txBody>
+      </p:sp>
+      <mc:AlternateContent xmlns:mc="http://schemas.openxmlformats.org/markup-compatibility/2006" xmlns:a14="http://schemas.microsoft.com/office/drawing/2010/main">
+        <mc:Choice Requires="a14">
+          <p:sp>
+            <p:nvSpPr>
+              <p:cNvPr id="3" name="Content Placeholder 2"/>
+              <p:cNvSpPr>
+                <a:spLocks noGrp="1"/>
+              </p:cNvSpPr>
+              <p:nvPr>
+                <p:ph idx="1"/>
+              </p:nvPr>
+            </p:nvSpPr>
+            <p:spPr/>
+            <p:txBody>
+              <a:bodyPr/>
+              <a:lstStyle/>
+              <a:p>
+                <a:pPr marL="0" indent="0">
+                  <a:buNone/>
+                </a:pPr>
+                <a:r>
+                  <a:rPr lang="en-US" dirty="0" smtClean="0"/>
+                  <a:t>Confidence interval:</a:t>
+                </a:r>
+              </a:p>
+              <a:p>
+                <a:pPr lvl="1"/>
+                <a:r>
+                  <a:rPr lang="en-US" dirty="0" smtClean="0"/>
+                  <a:t>Parameter estimates are normally distributed</a:t>
+                </a:r>
+              </a:p>
+              <a:p>
+                <a:r>
+                  <a:rPr lang="en-US" dirty="0" smtClean="0"/>
+                  <a:t>Computation</a:t>
+                </a:r>
+              </a:p>
+              <a:p>
+                <a:pPr marL="457200" lvl="1" indent="0">
+                  <a:buNone/>
+                </a:pPr>
+                <a14:m>
+                  <m:oMathPara xmlns:m="http://schemas.openxmlformats.org/officeDocument/2006/math">
+                    <m:oMathParaPr>
+                      <m:jc m:val="centerGroup"/>
+                    </m:oMathParaPr>
+                    <m:oMath xmlns:m="http://schemas.openxmlformats.org/officeDocument/2006/math">
+                      <m:sSub>
+                        <m:sSubPr>
+                          <m:ctrlPr>
+                            <a:rPr lang="en-US" b="0" i="1" smtClean="0">
+                              <a:latin typeface="Cambria Math" panose="02040503050406030204" pitchFamily="18" charset="0"/>
+                            </a:rPr>
+                          </m:ctrlPr>
+                        </m:sSubPr>
+                        <m:e>
+                          <m:r>
+                            <a:rPr lang="en-US" b="0" i="1" smtClean="0">
+                              <a:latin typeface="Cambria Math" panose="02040503050406030204" pitchFamily="18" charset="0"/>
+                            </a:rPr>
+                            <m:t>𝐶𝐼</m:t>
+                          </m:r>
+                        </m:e>
+                        <m:sub>
+                          <m:r>
+                            <a:rPr lang="en-US" b="0" i="1" smtClean="0">
+                              <a:latin typeface="Cambria Math" panose="02040503050406030204" pitchFamily="18" charset="0"/>
+                            </a:rPr>
+                            <m:t>𝑥</m:t>
+                          </m:r>
+                          <m:r>
+                            <a:rPr lang="en-US" b="0" i="1" smtClean="0">
+                              <a:latin typeface="Cambria Math" panose="02040503050406030204" pitchFamily="18" charset="0"/>
+                            </a:rPr>
+                            <m:t>%</m:t>
+                          </m:r>
+                        </m:sub>
+                      </m:sSub>
+                      <m:d>
+                        <m:dPr>
+                          <m:ctrlPr>
+                            <a:rPr lang="en-US" b="0" i="1" smtClean="0">
+                              <a:latin typeface="Cambria Math" panose="02040503050406030204" pitchFamily="18" charset="0"/>
+                            </a:rPr>
+                          </m:ctrlPr>
+                        </m:dPr>
+                        <m:e>
+                          <m:acc>
+                            <m:accPr>
+                              <m:chr m:val="̂"/>
+                              <m:ctrlPr>
+                                <a:rPr lang="en-US" b="0" i="1" smtClean="0">
+                                  <a:latin typeface="Cambria Math" panose="02040503050406030204" pitchFamily="18" charset="0"/>
+                                </a:rPr>
+                              </m:ctrlPr>
+                            </m:accPr>
+                            <m:e>
+                              <m:r>
+                                <a:rPr lang="en-US" i="1">
+                                  <a:latin typeface="Cambria Math" panose="02040503050406030204" pitchFamily="18" charset="0"/>
+                                  <a:ea typeface="Cambria Math" panose="02040503050406030204" pitchFamily="18" charset="0"/>
+                                </a:rPr>
+                                <m:t>𝜃</m:t>
+                              </m:r>
+                            </m:e>
+                          </m:acc>
+                        </m:e>
+                      </m:d>
+                      <m:r>
+                        <a:rPr lang="en-US" b="0" i="1" smtClean="0">
+                          <a:latin typeface="Cambria Math" panose="02040503050406030204" pitchFamily="18" charset="0"/>
+                        </a:rPr>
+                        <m:t>=</m:t>
+                      </m:r>
+                      <m:acc>
+                        <m:accPr>
+                          <m:chr m:val="̂"/>
+                          <m:ctrlPr>
+                            <a:rPr lang="en-US" i="1">
+                              <a:latin typeface="Cambria Math" panose="02040503050406030204" pitchFamily="18" charset="0"/>
+                            </a:rPr>
+                          </m:ctrlPr>
+                        </m:accPr>
+                        <m:e>
+                          <m:r>
+                            <a:rPr lang="en-US" i="1">
+                              <a:latin typeface="Cambria Math" panose="02040503050406030204" pitchFamily="18" charset="0"/>
+                              <a:ea typeface="Cambria Math" panose="02040503050406030204" pitchFamily="18" charset="0"/>
+                            </a:rPr>
+                            <m:t>𝜃</m:t>
+                          </m:r>
+                        </m:e>
+                      </m:acc>
+                      <m:r>
+                        <a:rPr lang="en-US" i="1">
+                          <a:latin typeface="Cambria Math" panose="02040503050406030204" pitchFamily="18" charset="0"/>
+                          <a:ea typeface="Cambria Math" panose="02040503050406030204" pitchFamily="18" charset="0"/>
+                        </a:rPr>
+                        <m:t>±</m:t>
+                      </m:r>
+                      <m:acc>
+                        <m:accPr>
+                          <m:chr m:val="̂"/>
+                          <m:ctrlPr>
+                            <a:rPr lang="en-US" b="0" i="1" smtClean="0">
+                              <a:latin typeface="Cambria Math" panose="02040503050406030204" pitchFamily="18" charset="0"/>
+                              <a:ea typeface="Cambria Math" panose="02040503050406030204" pitchFamily="18" charset="0"/>
+                            </a:rPr>
+                          </m:ctrlPr>
+                        </m:accPr>
+                        <m:e>
+                          <m:r>
+                            <m:rPr>
+                              <m:sty m:val="p"/>
+                            </m:rPr>
+                            <a:rPr lang="en-US" i="0">
+                              <a:latin typeface="Cambria Math" panose="02040503050406030204" pitchFamily="18" charset="0"/>
+                              <a:ea typeface="Cambria Math" panose="02040503050406030204" pitchFamily="18" charset="0"/>
+                            </a:rPr>
+                            <m:t>SE</m:t>
+                          </m:r>
+                        </m:e>
+                      </m:acc>
+                      <m:r>
+                        <a:rPr lang="en-US" b="0" i="1" smtClean="0">
+                          <a:latin typeface="Cambria Math" panose="02040503050406030204" pitchFamily="18" charset="0"/>
+                          <a:ea typeface="Cambria Math" panose="02040503050406030204" pitchFamily="18" charset="0"/>
+                        </a:rPr>
+                        <m:t>(</m:t>
+                      </m:r>
+                      <m:acc>
+                        <m:accPr>
+                          <m:chr m:val="̂"/>
+                          <m:ctrlPr>
+                            <a:rPr lang="en-US" i="1">
+                              <a:latin typeface="Cambria Math" panose="02040503050406030204" pitchFamily="18" charset="0"/>
+                            </a:rPr>
+                          </m:ctrlPr>
+                        </m:accPr>
+                        <m:e>
+                          <m:r>
+                            <a:rPr lang="en-US" i="1">
+                              <a:latin typeface="Cambria Math" panose="02040503050406030204" pitchFamily="18" charset="0"/>
+                              <a:ea typeface="Cambria Math" panose="02040503050406030204" pitchFamily="18" charset="0"/>
+                            </a:rPr>
+                            <m:t>𝜃</m:t>
+                          </m:r>
+                        </m:e>
+                      </m:acc>
+                      <m:r>
+                        <a:rPr lang="en-US" b="0" i="1" smtClean="0">
+                          <a:latin typeface="Cambria Math" panose="02040503050406030204" pitchFamily="18" charset="0"/>
+                          <a:ea typeface="Cambria Math" panose="02040503050406030204" pitchFamily="18" charset="0"/>
+                        </a:rPr>
+                        <m:t>)×</m:t>
+                      </m:r>
+                      <m:sSup>
+                        <m:sSupPr>
+                          <m:ctrlPr>
+                            <a:rPr lang="en-US" b="0" i="1" smtClean="0">
+                              <a:latin typeface="Cambria Math" panose="02040503050406030204" pitchFamily="18" charset="0"/>
+                              <a:ea typeface="Cambria Math" panose="02040503050406030204" pitchFamily="18" charset="0"/>
+                            </a:rPr>
+                          </m:ctrlPr>
+                        </m:sSupPr>
+                        <m:e>
+                          <m:r>
+                            <m:rPr>
+                              <m:sty m:val="p"/>
+                            </m:rPr>
+                            <a:rPr lang="el-GR" b="0" i="1" smtClean="0">
+                              <a:latin typeface="Cambria Math" panose="02040503050406030204" pitchFamily="18" charset="0"/>
+                              <a:ea typeface="Cambria Math" panose="02040503050406030204" pitchFamily="18" charset="0"/>
+                            </a:rPr>
+                            <m:t>Φ</m:t>
+                          </m:r>
+                        </m:e>
+                        <m:sup>
+                          <m:r>
+                            <a:rPr lang="en-US" b="0" i="1" smtClean="0">
+                              <a:latin typeface="Cambria Math" panose="02040503050406030204" pitchFamily="18" charset="0"/>
+                              <a:ea typeface="Cambria Math" panose="02040503050406030204" pitchFamily="18" charset="0"/>
+                            </a:rPr>
+                            <m:t>−1</m:t>
+                          </m:r>
+                        </m:sup>
+                      </m:sSup>
+                      <m:d>
+                        <m:dPr>
+                          <m:ctrlPr>
+                            <a:rPr lang="en-US" b="0" i="1" smtClean="0">
+                              <a:latin typeface="Cambria Math" panose="02040503050406030204" pitchFamily="18" charset="0"/>
+                              <a:ea typeface="Cambria Math" panose="02040503050406030204" pitchFamily="18" charset="0"/>
+                            </a:rPr>
+                          </m:ctrlPr>
+                        </m:dPr>
+                        <m:e>
+                          <m:f>
+                            <m:fPr>
+                              <m:ctrlPr>
+                                <a:rPr lang="en-US" i="1">
+                                  <a:latin typeface="Cambria Math" panose="02040503050406030204" pitchFamily="18" charset="0"/>
+                                  <a:ea typeface="Cambria Math" panose="02040503050406030204" pitchFamily="18" charset="0"/>
+                                </a:rPr>
+                              </m:ctrlPr>
+                            </m:fPr>
+                            <m:num>
+                              <m:r>
+                                <a:rPr lang="en-US" i="1">
+                                  <a:latin typeface="Cambria Math" panose="02040503050406030204" pitchFamily="18" charset="0"/>
+                                </a:rPr>
+                                <m:t>𝑥</m:t>
+                              </m:r>
+                            </m:num>
+                            <m:den>
+                              <m:r>
+                                <a:rPr lang="en-US" i="1">
+                                  <a:latin typeface="Cambria Math" panose="02040503050406030204" pitchFamily="18" charset="0"/>
+                                </a:rPr>
+                                <m:t>2</m:t>
+                              </m:r>
+                            </m:den>
+                          </m:f>
+                        </m:e>
+                      </m:d>
+                    </m:oMath>
+                  </m:oMathPara>
+                </a14:m>
+                <a:endParaRPr lang="en-US" dirty="0" smtClean="0"/>
+              </a:p>
+              <a:p>
+                <a:pPr lvl="1"/>
+                <a:r>
+                  <a:rPr lang="en-US" dirty="0" smtClean="0"/>
+                  <a:t>Where </a:t>
+                </a:r>
+                <a14:m>
+                  <m:oMath xmlns:m="http://schemas.openxmlformats.org/officeDocument/2006/math">
+                    <m:sSub>
+                      <m:sSubPr>
+                        <m:ctrlPr>
+                          <a:rPr lang="en-US" i="1">
+                            <a:latin typeface="Cambria Math" panose="02040503050406030204" pitchFamily="18" charset="0"/>
+                          </a:rPr>
+                        </m:ctrlPr>
+                      </m:sSubPr>
+                      <m:e>
+                        <m:r>
+                          <a:rPr lang="en-US" i="1">
+                            <a:latin typeface="Cambria Math" panose="02040503050406030204" pitchFamily="18" charset="0"/>
+                          </a:rPr>
+                          <m:t>𝐶𝐼</m:t>
+                        </m:r>
+                      </m:e>
+                      <m:sub>
+                        <m:r>
+                          <a:rPr lang="en-US" i="1">
+                            <a:latin typeface="Cambria Math" panose="02040503050406030204" pitchFamily="18" charset="0"/>
+                          </a:rPr>
+                          <m:t>𝑥</m:t>
+                        </m:r>
+                        <m:r>
+                          <a:rPr lang="en-US" i="1">
+                            <a:latin typeface="Cambria Math" panose="02040503050406030204" pitchFamily="18" charset="0"/>
+                          </a:rPr>
+                          <m:t>%</m:t>
+                        </m:r>
+                      </m:sub>
+                    </m:sSub>
+                  </m:oMath>
+                </a14:m>
+                <a:r>
+                  <a:rPr lang="en-US" dirty="0" smtClean="0"/>
+                  <a:t> contains the true value x% of the time if the model is correct</a:t>
+                </a:r>
+              </a:p>
+              <a:p>
+                <a:pPr lvl="1"/>
+                <a14:m>
+                  <m:oMath xmlns:m="http://schemas.openxmlformats.org/officeDocument/2006/math">
+                    <m:sSup>
+                      <m:sSupPr>
+                        <m:ctrlPr>
+                          <a:rPr lang="en-US" i="1">
+                            <a:latin typeface="Cambria Math" panose="02040503050406030204" pitchFamily="18" charset="0"/>
+                            <a:ea typeface="Cambria Math" panose="02040503050406030204" pitchFamily="18" charset="0"/>
+                          </a:rPr>
+                        </m:ctrlPr>
+                      </m:sSupPr>
+                      <m:e>
+                        <m:r>
+                          <m:rPr>
+                            <m:sty m:val="p"/>
+                          </m:rPr>
+                          <a:rPr lang="el-GR" i="1">
+                            <a:latin typeface="Cambria Math" panose="02040503050406030204" pitchFamily="18" charset="0"/>
+                            <a:ea typeface="Cambria Math" panose="02040503050406030204" pitchFamily="18" charset="0"/>
+                          </a:rPr>
+                          <m:t>Φ</m:t>
+                        </m:r>
+                      </m:e>
+                      <m:sup>
+                        <m:r>
+                          <a:rPr lang="en-US" i="1">
+                            <a:latin typeface="Cambria Math" panose="02040503050406030204" pitchFamily="18" charset="0"/>
+                            <a:ea typeface="Cambria Math" panose="02040503050406030204" pitchFamily="18" charset="0"/>
+                          </a:rPr>
+                          <m:t>−1</m:t>
+                        </m:r>
+                      </m:sup>
+                    </m:sSup>
+                  </m:oMath>
+                </a14:m>
+                <a:r>
+                  <a:rPr lang="en-US" dirty="0" smtClean="0"/>
+                  <a:t> is the inverse cumulative distribution for a normal distribution</a:t>
+                </a:r>
+              </a:p>
+              <a:p>
+                <a:pPr lvl="1"/>
+                <a14:m>
+                  <m:oMath xmlns:m="http://schemas.openxmlformats.org/officeDocument/2006/math">
+                    <m:acc>
+                      <m:accPr>
+                        <m:chr m:val="̂"/>
+                        <m:ctrlPr>
+                          <a:rPr lang="en-US" i="1">
+                            <a:latin typeface="Cambria Math" panose="02040503050406030204" pitchFamily="18" charset="0"/>
+                          </a:rPr>
+                        </m:ctrlPr>
+                      </m:accPr>
+                      <m:e>
+                        <m:r>
+                          <a:rPr lang="en-US" i="1">
+                            <a:latin typeface="Cambria Math" panose="02040503050406030204" pitchFamily="18" charset="0"/>
+                            <a:ea typeface="Cambria Math" panose="02040503050406030204" pitchFamily="18" charset="0"/>
+                          </a:rPr>
+                          <m:t>𝜃</m:t>
+                        </m:r>
+                      </m:e>
+                    </m:acc>
+                  </m:oMath>
+                </a14:m>
+                <a:r>
+                  <a:rPr lang="en-US" dirty="0" smtClean="0"/>
+                  <a:t> is the estimate for parameter </a:t>
+                </a:r>
+                <a14:m>
+                  <m:oMath xmlns:m="http://schemas.openxmlformats.org/officeDocument/2006/math">
+                    <m:r>
+                      <a:rPr lang="en-US" i="1">
+                        <a:latin typeface="Cambria Math" panose="02040503050406030204" pitchFamily="18" charset="0"/>
+                        <a:ea typeface="Cambria Math" panose="02040503050406030204" pitchFamily="18" charset="0"/>
+                      </a:rPr>
+                      <m:t>𝜃</m:t>
+                    </m:r>
+                  </m:oMath>
+                </a14:m>
+                <a:endParaRPr lang="en-US" dirty="0"/>
+              </a:p>
+              <a:p>
+                <a:pPr lvl="1"/>
+                <a14:m>
+                  <m:oMath xmlns:m="http://schemas.openxmlformats.org/officeDocument/2006/math">
+                    <m:acc>
+                      <m:accPr>
+                        <m:chr m:val="̂"/>
+                        <m:ctrlPr>
+                          <a:rPr lang="en-US" i="1">
+                            <a:latin typeface="Cambria Math" panose="02040503050406030204" pitchFamily="18" charset="0"/>
+                            <a:ea typeface="Cambria Math" panose="02040503050406030204" pitchFamily="18" charset="0"/>
+                          </a:rPr>
+                        </m:ctrlPr>
+                      </m:accPr>
+                      <m:e>
+                        <m:r>
+                          <m:rPr>
+                            <m:sty m:val="p"/>
+                          </m:rPr>
+                          <a:rPr lang="en-US">
+                            <a:latin typeface="Cambria Math" panose="02040503050406030204" pitchFamily="18" charset="0"/>
+                            <a:ea typeface="Cambria Math" panose="02040503050406030204" pitchFamily="18" charset="0"/>
+                          </a:rPr>
+                          <m:t>SE</m:t>
+                        </m:r>
+                      </m:e>
+                    </m:acc>
+                    <m:r>
+                      <a:rPr lang="en-US" i="1">
+                        <a:latin typeface="Cambria Math" panose="02040503050406030204" pitchFamily="18" charset="0"/>
+                        <a:ea typeface="Cambria Math" panose="02040503050406030204" pitchFamily="18" charset="0"/>
+                      </a:rPr>
+                      <m:t>(</m:t>
+                    </m:r>
+                    <m:acc>
+                      <m:accPr>
+                        <m:chr m:val="̂"/>
+                        <m:ctrlPr>
+                          <a:rPr lang="en-US" i="1">
+                            <a:latin typeface="Cambria Math" panose="02040503050406030204" pitchFamily="18" charset="0"/>
+                          </a:rPr>
+                        </m:ctrlPr>
+                      </m:accPr>
+                      <m:e>
+                        <m:r>
+                          <a:rPr lang="en-US" i="1">
+                            <a:latin typeface="Cambria Math" panose="02040503050406030204" pitchFamily="18" charset="0"/>
+                            <a:ea typeface="Cambria Math" panose="02040503050406030204" pitchFamily="18" charset="0"/>
+                          </a:rPr>
+                          <m:t>𝜃</m:t>
+                        </m:r>
+                      </m:e>
+                    </m:acc>
+                    <m:r>
+                      <a:rPr lang="en-US" i="1">
+                        <a:latin typeface="Cambria Math" panose="02040503050406030204" pitchFamily="18" charset="0"/>
+                        <a:ea typeface="Cambria Math" panose="02040503050406030204" pitchFamily="18" charset="0"/>
+                      </a:rPr>
+                      <m:t>)</m:t>
+                    </m:r>
+                  </m:oMath>
+                </a14:m>
+                <a:r>
+                  <a:rPr lang="en-GB" b="1" dirty="0" smtClean="0"/>
+                  <a:t> </a:t>
+                </a:r>
+                <a:r>
+                  <a:rPr lang="en-GB" dirty="0" smtClean="0"/>
+                  <a:t>is the estimated standard error for parameter </a:t>
+                </a:r>
+                <a14:m>
+                  <m:oMath xmlns:m="http://schemas.openxmlformats.org/officeDocument/2006/math">
+                    <m:r>
+                      <a:rPr lang="en-US" i="1">
+                        <a:latin typeface="Cambria Math" panose="02040503050406030204" pitchFamily="18" charset="0"/>
+                        <a:ea typeface="Cambria Math" panose="02040503050406030204" pitchFamily="18" charset="0"/>
+                      </a:rPr>
+                      <m:t>𝜃</m:t>
+                    </m:r>
+                  </m:oMath>
+                </a14:m>
+                <a:endParaRPr lang="en-GB" dirty="0"/>
+              </a:p>
+            </p:txBody>
+          </p:sp>
+        </mc:Choice>
+        <mc:Fallback xmlns="">
+          <p:sp>
+            <p:nvSpPr>
+              <p:cNvPr id="3" name="Content Placeholder 2"/>
+              <p:cNvSpPr>
+                <a:spLocks noGrp="1" noRot="1" noChangeAspect="1" noMove="1" noResize="1" noEditPoints="1" noAdjustHandles="1" noChangeArrowheads="1" noChangeShapeType="1" noTextEdit="1"/>
+              </p:cNvSpPr>
+              <p:nvPr>
+                <p:ph idx="1"/>
+              </p:nvPr>
+            </p:nvSpPr>
+            <p:spPr>
+              <a:blipFill>
+                <a:blip r:embed="rId2"/>
+                <a:stretch>
+                  <a:fillRect l="-1424" t="-1026"/>
+                </a:stretch>
+              </a:blipFill>
+            </p:spPr>
+            <p:txBody>
+              <a:bodyPr/>
+              <a:lstStyle/>
+              <a:p>
+                <a:r>
+                  <a:rPr lang="en-GB">
+                    <a:noFill/>
+                  </a:rPr>
+                  <a:t> </a:t>
+                </a:r>
+              </a:p>
+            </p:txBody>
+          </p:sp>
+        </mc:Fallback>
+      </mc:AlternateContent>
+    </p:spTree>
+    <p:extLst>
+      <p:ext uri="{BB962C8B-B14F-4D97-AF65-F5344CB8AC3E}">
+        <p14:creationId xmlns:p14="http://schemas.microsoft.com/office/powerpoint/2010/main" val="3952565397"/>
+      </p:ext>
+    </p:extLst>
+  </p:cSld>
+  <p:clrMapOvr>
+    <a:masterClrMapping/>
+  </p:clrMapOvr>
+  <p:timing>
+    <p:tnLst>
+      <p:par>
+        <p:cTn id="1" dur="indefinite" restart="never" nodeType="tmRoot"/>
+      </p:par>
+    </p:tnLst>
+  </p:timing>
+</p:sld>
+</file>
+
+<file path=ppt/slides/slide16.xml><?xml version="1.0" encoding="utf-8"?>
+<p:sld xmlns:a="http://schemas.openxmlformats.org/drawingml/2006/main" xmlns:r="http://schemas.openxmlformats.org/officeDocument/2006/relationships" xmlns:p="http://schemas.openxmlformats.org/presentationml/2006/main">
+  <p:cSld>
+    <p:spTree>
+      <p:nvGrpSpPr>
+        <p:cNvPr id="1" name=""/>
+        <p:cNvGrpSpPr/>
+        <p:nvPr/>
+      </p:nvGrpSpPr>
+      <p:grpSpPr>
+        <a:xfrm>
+          <a:off x="0" y="0"/>
+          <a:ext cx="0" cy="0"/>
+          <a:chOff x="0" y="0"/>
+          <a:chExt cx="0" cy="0"/>
+        </a:xfrm>
+      </p:grpSpPr>
+      <p:sp>
+        <p:nvSpPr>
+          <p:cNvPr id="2" name="Title 1"/>
+          <p:cNvSpPr>
+            <a:spLocks noGrp="1"/>
+          </p:cNvSpPr>
+          <p:nvPr>
+            <p:ph type="title"/>
+          </p:nvPr>
+        </p:nvSpPr>
+        <p:spPr/>
+        <p:txBody>
+          <a:bodyPr/>
+          <a:lstStyle/>
+          <a:p>
+            <a:endParaRPr lang="en-GB"/>
+          </a:p>
+        </p:txBody>
+      </p:sp>
+      <mc:AlternateContent xmlns:mc="http://schemas.openxmlformats.org/markup-compatibility/2006" xmlns:a14="http://schemas.microsoft.com/office/drawing/2010/main">
+        <mc:Choice Requires="a14">
+          <p:sp>
+            <p:nvSpPr>
+              <p:cNvPr id="3" name="Content Placeholder 2"/>
+              <p:cNvSpPr>
+                <a:spLocks noGrp="1"/>
+              </p:cNvSpPr>
+              <p:nvPr>
+                <p:ph idx="1"/>
+              </p:nvPr>
+            </p:nvSpPr>
+            <p:spPr/>
+            <p:txBody>
+              <a:bodyPr>
+                <a:normAutofit fontScale="92500" lnSpcReduction="10000"/>
+              </a:bodyPr>
+              <a:lstStyle/>
+              <a:p>
+                <a:pPr marL="0" indent="0">
+                  <a:buNone/>
+                </a:pPr>
+                <a:r>
+                  <a:rPr lang="en-US" dirty="0" smtClean="0"/>
+                  <a:t>Confidence interval coverage</a:t>
+                </a:r>
+              </a:p>
+              <a:p>
+                <a:pPr lvl="1"/>
+                <a:r>
+                  <a:rPr lang="en-US" i="1" dirty="0" smtClean="0"/>
+                  <a:t>Coverage</a:t>
+                </a:r>
+                <a:r>
+                  <a:rPr lang="en-US" dirty="0" smtClean="0"/>
+                  <a:t> – the expected proportion of times that an estimated x% confidence interval contains the true value given an estimation model and true “data-generating process”</a:t>
+                </a:r>
+              </a:p>
+              <a:p>
+                <a:pPr lvl="1"/>
+                <a:endParaRPr lang="en-US" i="1" dirty="0" smtClean="0"/>
+              </a:p>
+              <a:p>
+                <a:pPr marL="0" indent="0">
+                  <a:buNone/>
+                </a:pPr>
+                <a:r>
+                  <a:rPr lang="en-US" i="1" dirty="0" smtClean="0"/>
+                  <a:t>Estimation:</a:t>
+                </a:r>
+              </a:p>
+              <a:p>
+                <a:pPr marL="971550" lvl="1" indent="-514350">
+                  <a:buFont typeface="+mj-lt"/>
+                  <a:buAutoNum type="arabicPeriod"/>
+                </a:pPr>
+                <a:r>
+                  <a:rPr lang="en-US" dirty="0" smtClean="0"/>
+                  <a:t>Simulate data with a known value for parameter </a:t>
+                </a:r>
+                <a14:m>
+                  <m:oMath xmlns:m="http://schemas.openxmlformats.org/officeDocument/2006/math">
+                    <m:r>
+                      <a:rPr lang="en-US" i="1">
+                        <a:latin typeface="Cambria Math" panose="02040503050406030204" pitchFamily="18" charset="0"/>
+                        <a:ea typeface="Cambria Math" panose="02040503050406030204" pitchFamily="18" charset="0"/>
+                      </a:rPr>
+                      <m:t>𝜃</m:t>
+                    </m:r>
+                  </m:oMath>
+                </a14:m>
+                <a:endParaRPr lang="en-US" dirty="0" smtClean="0"/>
+              </a:p>
+              <a:p>
+                <a:pPr marL="971550" lvl="1" indent="-514350">
+                  <a:buFont typeface="+mj-lt"/>
+                  <a:buAutoNum type="arabicPeriod"/>
+                </a:pPr>
+                <a:r>
+                  <a:rPr lang="en-US" dirty="0" smtClean="0"/>
+                  <a:t>Record true parameter values</a:t>
+                </a:r>
+              </a:p>
+              <a:p>
+                <a:pPr marL="971550" lvl="1" indent="-514350">
+                  <a:buFont typeface="+mj-lt"/>
+                  <a:buAutoNum type="arabicPeriod"/>
+                </a:pPr>
+                <a:r>
+                  <a:rPr lang="en-US" dirty="0" smtClean="0"/>
+                  <a:t>Apply estimator</a:t>
+                </a:r>
+                <a:endParaRPr lang="en-GB" dirty="0" smtClean="0"/>
+              </a:p>
+              <a:p>
+                <a:pPr marL="971550" lvl="1" indent="-514350">
+                  <a:buFont typeface="+mj-lt"/>
+                  <a:buAutoNum type="arabicPeriod"/>
+                </a:pPr>
+                <a:r>
+                  <a:rPr lang="en-US" dirty="0" smtClean="0"/>
+                  <a:t>Record confidence interval </a:t>
+                </a:r>
+                <a14:m>
+                  <m:oMath xmlns:m="http://schemas.openxmlformats.org/officeDocument/2006/math">
+                    <m:sSub>
+                      <m:sSubPr>
+                        <m:ctrlPr>
+                          <a:rPr lang="en-US" i="1">
+                            <a:latin typeface="Cambria Math" panose="02040503050406030204" pitchFamily="18" charset="0"/>
+                          </a:rPr>
+                        </m:ctrlPr>
+                      </m:sSubPr>
+                      <m:e>
+                        <m:r>
+                          <a:rPr lang="en-US" i="1">
+                            <a:latin typeface="Cambria Math" panose="02040503050406030204" pitchFamily="18" charset="0"/>
+                          </a:rPr>
+                          <m:t>𝐶𝐼</m:t>
+                        </m:r>
+                      </m:e>
+                      <m:sub>
+                        <m:r>
+                          <a:rPr lang="en-US" i="1">
+                            <a:latin typeface="Cambria Math" panose="02040503050406030204" pitchFamily="18" charset="0"/>
+                          </a:rPr>
+                          <m:t>𝑥</m:t>
+                        </m:r>
+                        <m:r>
+                          <a:rPr lang="en-US" i="1">
+                            <a:latin typeface="Cambria Math" panose="02040503050406030204" pitchFamily="18" charset="0"/>
+                          </a:rPr>
+                          <m:t>%</m:t>
+                        </m:r>
+                      </m:sub>
+                    </m:sSub>
+                    <m:d>
+                      <m:dPr>
+                        <m:ctrlPr>
+                          <a:rPr lang="en-US" i="1">
+                            <a:latin typeface="Cambria Math" panose="02040503050406030204" pitchFamily="18" charset="0"/>
+                          </a:rPr>
+                        </m:ctrlPr>
+                      </m:dPr>
+                      <m:e>
+                        <m:acc>
+                          <m:accPr>
+                            <m:chr m:val="̂"/>
+                            <m:ctrlPr>
+                              <a:rPr lang="en-US" i="1">
+                                <a:latin typeface="Cambria Math" panose="02040503050406030204" pitchFamily="18" charset="0"/>
+                              </a:rPr>
+                            </m:ctrlPr>
+                          </m:accPr>
+                          <m:e>
+                            <m:r>
+                              <a:rPr lang="en-US" i="1">
+                                <a:latin typeface="Cambria Math" panose="02040503050406030204" pitchFamily="18" charset="0"/>
+                                <a:ea typeface="Cambria Math" panose="02040503050406030204" pitchFamily="18" charset="0"/>
+                              </a:rPr>
+                              <m:t>𝜃</m:t>
+                            </m:r>
+                          </m:e>
+                        </m:acc>
+                      </m:e>
+                    </m:d>
+                  </m:oMath>
+                </a14:m>
+                <a:r>
+                  <a:rPr lang="en-US" dirty="0" smtClean="0"/>
+                  <a:t> for parameter </a:t>
+                </a:r>
+                <a14:m>
+                  <m:oMath xmlns:m="http://schemas.openxmlformats.org/officeDocument/2006/math">
+                    <m:r>
+                      <a:rPr lang="en-US" i="1">
+                        <a:latin typeface="Cambria Math" panose="02040503050406030204" pitchFamily="18" charset="0"/>
+                        <a:ea typeface="Cambria Math" panose="02040503050406030204" pitchFamily="18" charset="0"/>
+                      </a:rPr>
+                      <m:t>𝜃</m:t>
+                    </m:r>
+                  </m:oMath>
+                </a14:m>
+                <a:endParaRPr lang="en-US" dirty="0" smtClean="0"/>
+              </a:p>
+              <a:p>
+                <a:pPr marL="971550" lvl="1" indent="-514350">
+                  <a:buFont typeface="+mj-lt"/>
+                  <a:buAutoNum type="arabicPeriod"/>
+                </a:pPr>
+                <a:r>
+                  <a:rPr lang="en-US" dirty="0" smtClean="0"/>
+                  <a:t>Repeat steps 1-4 hundreds of times</a:t>
+                </a:r>
+              </a:p>
+              <a:p>
+                <a:pPr marL="971550" lvl="1" indent="-514350">
+                  <a:buFont typeface="+mj-lt"/>
+                  <a:buAutoNum type="arabicPeriod"/>
+                </a:pPr>
+                <a:r>
+                  <a:rPr lang="en-US" dirty="0" smtClean="0"/>
+                  <a:t>Compute the proportion of times where </a:t>
+                </a:r>
+                <a14:m>
+                  <m:oMath xmlns:m="http://schemas.openxmlformats.org/officeDocument/2006/math">
+                    <m:sSub>
+                      <m:sSubPr>
+                        <m:ctrlPr>
+                          <a:rPr lang="en-US" i="1">
+                            <a:latin typeface="Cambria Math" panose="02040503050406030204" pitchFamily="18" charset="0"/>
+                          </a:rPr>
+                        </m:ctrlPr>
+                      </m:sSubPr>
+                      <m:e>
+                        <m:r>
+                          <a:rPr lang="en-US" i="1">
+                            <a:latin typeface="Cambria Math" panose="02040503050406030204" pitchFamily="18" charset="0"/>
+                          </a:rPr>
+                          <m:t>𝐶𝐼</m:t>
+                        </m:r>
+                      </m:e>
+                      <m:sub>
+                        <m:r>
+                          <a:rPr lang="en-US" i="1">
+                            <a:latin typeface="Cambria Math" panose="02040503050406030204" pitchFamily="18" charset="0"/>
+                          </a:rPr>
+                          <m:t>𝑥</m:t>
+                        </m:r>
+                        <m:r>
+                          <a:rPr lang="en-US" i="1">
+                            <a:latin typeface="Cambria Math" panose="02040503050406030204" pitchFamily="18" charset="0"/>
+                          </a:rPr>
+                          <m:t>%</m:t>
+                        </m:r>
+                      </m:sub>
+                    </m:sSub>
+                    <m:d>
+                      <m:dPr>
+                        <m:ctrlPr>
+                          <a:rPr lang="en-US" i="1">
+                            <a:latin typeface="Cambria Math" panose="02040503050406030204" pitchFamily="18" charset="0"/>
+                          </a:rPr>
+                        </m:ctrlPr>
+                      </m:dPr>
+                      <m:e>
+                        <m:acc>
+                          <m:accPr>
+                            <m:chr m:val="̂"/>
+                            <m:ctrlPr>
+                              <a:rPr lang="en-US" i="1">
+                                <a:latin typeface="Cambria Math" panose="02040503050406030204" pitchFamily="18" charset="0"/>
+                              </a:rPr>
+                            </m:ctrlPr>
+                          </m:accPr>
+                          <m:e>
+                            <m:r>
+                              <a:rPr lang="en-US" i="1">
+                                <a:latin typeface="Cambria Math" panose="02040503050406030204" pitchFamily="18" charset="0"/>
+                                <a:ea typeface="Cambria Math" panose="02040503050406030204" pitchFamily="18" charset="0"/>
+                              </a:rPr>
+                              <m:t>𝜃</m:t>
+                            </m:r>
+                          </m:e>
+                        </m:acc>
+                      </m:e>
+                    </m:d>
+                  </m:oMath>
+                </a14:m>
+                <a:r>
+                  <a:rPr lang="en-US" dirty="0" smtClean="0"/>
+                  <a:t> contains the true value for parameter </a:t>
+                </a:r>
+                <a14:m>
+                  <m:oMath xmlns:m="http://schemas.openxmlformats.org/officeDocument/2006/math">
+                    <m:r>
+                      <a:rPr lang="en-US" i="1">
+                        <a:latin typeface="Cambria Math" panose="02040503050406030204" pitchFamily="18" charset="0"/>
+                        <a:ea typeface="Cambria Math" panose="02040503050406030204" pitchFamily="18" charset="0"/>
+                      </a:rPr>
+                      <m:t>𝜃</m:t>
+                    </m:r>
+                  </m:oMath>
+                </a14:m>
+                <a:endParaRPr lang="en-US" dirty="0" smtClean="0"/>
+              </a:p>
+            </p:txBody>
+          </p:sp>
+        </mc:Choice>
+        <mc:Fallback xmlns="">
+          <p:sp>
+            <p:nvSpPr>
+              <p:cNvPr id="3" name="Content Placeholder 2"/>
+              <p:cNvSpPr>
+                <a:spLocks noGrp="1" noRot="1" noChangeAspect="1" noMove="1" noResize="1" noEditPoints="1" noAdjustHandles="1" noChangeArrowheads="1" noChangeShapeType="1" noTextEdit="1"/>
+              </p:cNvSpPr>
+              <p:nvPr>
+                <p:ph idx="1"/>
+              </p:nvPr>
+            </p:nvSpPr>
+            <p:spPr>
+              <a:blipFill>
+                <a:blip r:embed="rId2"/>
+                <a:stretch>
+                  <a:fillRect l="-1220" t="-1641"/>
+                </a:stretch>
+              </a:blipFill>
+            </p:spPr>
+            <p:txBody>
+              <a:bodyPr/>
+              <a:lstStyle/>
+              <a:p>
+                <a:r>
+                  <a:rPr lang="en-GB">
+                    <a:noFill/>
+                  </a:rPr>
+                  <a:t> </a:t>
+                </a:r>
+              </a:p>
+            </p:txBody>
+          </p:sp>
+        </mc:Fallback>
+      </mc:AlternateContent>
+    </p:spTree>
+    <p:extLst>
+      <p:ext uri="{BB962C8B-B14F-4D97-AF65-F5344CB8AC3E}">
+        <p14:creationId xmlns:p14="http://schemas.microsoft.com/office/powerpoint/2010/main" val="2441365931"/>
+      </p:ext>
+    </p:extLst>
+  </p:cSld>
+  <p:clrMapOvr>
+    <a:masterClrMapping/>
+  </p:clrMapOvr>
+  <p:timing>
+    <p:tnLst>
+      <p:par>
+        <p:cTn id="1" dur="indefinite" restart="never" nodeType="tmRoot"/>
+      </p:par>
+    </p:tnLst>
+  </p:timing>
+</p:sld>
+</file>
+
+<file path=ppt/slides/slide17.xml><?xml version="1.0" encoding="utf-8"?>
+<p:sld xmlns:a="http://schemas.openxmlformats.org/drawingml/2006/main" xmlns:r="http://schemas.openxmlformats.org/officeDocument/2006/relationships" xmlns:p="http://schemas.openxmlformats.org/presentationml/2006/main">
+  <p:cSld>
+    <p:spTree>
+      <p:nvGrpSpPr>
+        <p:cNvPr id="1" name=""/>
+        <p:cNvGrpSpPr/>
+        <p:nvPr/>
+      </p:nvGrpSpPr>
+      <p:grpSpPr>
+        <a:xfrm>
+          <a:off x="0" y="0"/>
+          <a:ext cx="0" cy="0"/>
+          <a:chOff x="0" y="0"/>
+          <a:chExt cx="0" cy="0"/>
+        </a:xfrm>
+      </p:grpSpPr>
+      <p:sp>
+        <p:nvSpPr>
+          <p:cNvPr id="2" name="Title 1"/>
+          <p:cNvSpPr>
+            <a:spLocks noGrp="1"/>
+          </p:cNvSpPr>
+          <p:nvPr>
+            <p:ph type="title"/>
+          </p:nvPr>
+        </p:nvSpPr>
+        <p:spPr/>
+        <p:txBody>
+          <a:bodyPr/>
+          <a:lstStyle/>
+          <a:p>
+            <a:r>
+              <a:rPr lang="en-US" dirty="0"/>
+              <a:t>Mixed-effects models</a:t>
+            </a:r>
+            <a:endParaRPr lang="en-GB" dirty="0"/>
+          </a:p>
+        </p:txBody>
+      </p:sp>
+      <p:sp>
+        <p:nvSpPr>
+          <p:cNvPr id="3" name="Content Placeholder 2"/>
+          <p:cNvSpPr>
+            <a:spLocks noGrp="1"/>
+          </p:cNvSpPr>
+          <p:nvPr>
+            <p:ph idx="1"/>
+          </p:nvPr>
+        </p:nvSpPr>
+        <p:spPr/>
+        <p:txBody>
+          <a:bodyPr/>
+          <a:lstStyle/>
+          <a:p>
+            <a:pPr marL="0" indent="0">
+              <a:buNone/>
+            </a:pPr>
+            <a:endParaRPr lang="en-US" dirty="0" smtClean="0"/>
+          </a:p>
+          <a:p>
+            <a:pPr marL="0" indent="0" algn="ctr">
+              <a:buNone/>
+            </a:pPr>
+            <a:r>
+              <a:rPr lang="en-US" dirty="0" smtClean="0"/>
+              <a:t>[Explore “map” argument to TMB]</a:t>
+            </a:r>
+            <a:endParaRPr lang="en-GB" dirty="0"/>
+          </a:p>
+        </p:txBody>
+      </p:sp>
+    </p:spTree>
+    <p:extLst>
+      <p:ext uri="{BB962C8B-B14F-4D97-AF65-F5344CB8AC3E}">
+        <p14:creationId xmlns:p14="http://schemas.microsoft.com/office/powerpoint/2010/main" val="1439651146"/>
       </p:ext>
     </p:extLst>
   </p:cSld>
@@ -6207,7 +7247,6 @@
               <a:rPr lang="en-US" dirty="0"/>
               <a:t>Mixed-effects models</a:t>
             </a:r>
-            <a:endParaRPr lang="en-US" dirty="0"/>
           </a:p>
         </p:txBody>
       </p:sp>
@@ -8377,7 +9416,6 @@
               <a:rPr lang="en-US" dirty="0"/>
               <a:t>Mixed-effects models</a:t>
             </a:r>
-            <a:endParaRPr lang="en-US" dirty="0"/>
           </a:p>
         </p:txBody>
       </p:sp>
@@ -9138,7 +10176,6 @@
               <a:rPr lang="en-US" dirty="0"/>
               <a:t>Mixed-effects models</a:t>
             </a:r>
-            <a:endParaRPr lang="en-US" dirty="0"/>
           </a:p>
         </p:txBody>
       </p:sp>
@@ -10348,7 +11385,7 @@
           <a:graphicData uri="http://schemas.openxmlformats.org/presentationml/2006/ole">
             <mc:AlternateContent xmlns:mc="http://schemas.openxmlformats.org/markup-compatibility/2006">
               <mc:Choice xmlns:v="urn:schemas-microsoft-com:vml" Requires="v">
-                <p:oleObj spid="_x0000_s1033" name="Equation" r:id="rId4" imgW="914400" imgH="291960" progId="Equation.DSMT4">
+                <p:oleObj spid="_x0000_s1035" name="Equation" r:id="rId4" imgW="914400" imgH="291960" progId="Equation.DSMT4">
                   <p:embed/>
                 </p:oleObj>
               </mc:Choice>
@@ -10439,7 +11476,6 @@
               <a:rPr lang="en-US" dirty="0"/>
               <a:t>Mixed-effects models</a:t>
             </a:r>
-            <a:endParaRPr lang="en-US" dirty="0"/>
           </a:p>
         </p:txBody>
       </p:sp>
@@ -10946,7 +11982,6 @@
               <a:rPr lang="en-US" dirty="0"/>
               <a:t>Mixed-effects models</a:t>
             </a:r>
-            <a:endParaRPr lang="en-US" dirty="0"/>
           </a:p>
         </p:txBody>
       </p:sp>
@@ -11042,7 +12077,6 @@
               <a:rPr lang="en-US" dirty="0"/>
               <a:t>Mixed-effects models</a:t>
             </a:r>
-            <a:endParaRPr lang="en-US" dirty="0"/>
           </a:p>
         </p:txBody>
       </p:sp>

</xml_diff>